<commit_message>
Una versión del hyperblog
</commit_message>
<xml_diff>
--- a/clases.pptx
+++ b/clases.pptx
@@ -6,6 +6,11 @@
   </p:sldMasterIdLst>
   <p:sldIdLst>
     <p:sldId id="256" r:id="rId2"/>
+    <p:sldId id="257" r:id="rId3"/>
+    <p:sldId id="258" r:id="rId4"/>
+    <p:sldId id="259" r:id="rId5"/>
+    <p:sldId id="260" r:id="rId6"/>
+    <p:sldId id="261" r:id="rId7"/>
   </p:sldIdLst>
   <p:sldSz cx="12192000" cy="6858000"/>
   <p:notesSz cx="6858000" cy="9144000"/>
@@ -104,6 +109,11 @@
       </a:defRPr>
     </a:lvl9pPr>
   </p:defaultTextStyle>
+  <p:extLst>
+    <p:ext uri="{EFAFB233-063F-42B5-8137-9DF3F51BA10A}">
+      <p15:sldGuideLst xmlns:p15="http://schemas.microsoft.com/office/powerpoint/2012/main"/>
+    </p:ext>
+  </p:extLst>
 </p:presentation>
 </file>
 
@@ -238,7 +248,7 @@
           <a:p>
             <a:fld id="{2EA38707-1077-4A4E-A639-4D8934A136F8}" type="datetimeFigureOut">
               <a:rPr lang="es-CO" smtClean="0"/>
-              <a:t>29/11/2021</a:t>
+              <a:t>02/12/2021</a:t>
             </a:fld>
             <a:endParaRPr lang="es-CO"/>
           </a:p>
@@ -408,7 +418,7 @@
           <a:p>
             <a:fld id="{2EA38707-1077-4A4E-A639-4D8934A136F8}" type="datetimeFigureOut">
               <a:rPr lang="es-CO" smtClean="0"/>
-              <a:t>29/11/2021</a:t>
+              <a:t>02/12/2021</a:t>
             </a:fld>
             <a:endParaRPr lang="es-CO"/>
           </a:p>
@@ -588,7 +598,7 @@
           <a:p>
             <a:fld id="{2EA38707-1077-4A4E-A639-4D8934A136F8}" type="datetimeFigureOut">
               <a:rPr lang="es-CO" smtClean="0"/>
-              <a:t>29/11/2021</a:t>
+              <a:t>02/12/2021</a:t>
             </a:fld>
             <a:endParaRPr lang="es-CO"/>
           </a:p>
@@ -758,7 +768,7 @@
           <a:p>
             <a:fld id="{2EA38707-1077-4A4E-A639-4D8934A136F8}" type="datetimeFigureOut">
               <a:rPr lang="es-CO" smtClean="0"/>
-              <a:t>29/11/2021</a:t>
+              <a:t>02/12/2021</a:t>
             </a:fld>
             <a:endParaRPr lang="es-CO"/>
           </a:p>
@@ -1004,7 +1014,7 @@
           <a:p>
             <a:fld id="{2EA38707-1077-4A4E-A639-4D8934A136F8}" type="datetimeFigureOut">
               <a:rPr lang="es-CO" smtClean="0"/>
-              <a:t>29/11/2021</a:t>
+              <a:t>02/12/2021</a:t>
             </a:fld>
             <a:endParaRPr lang="es-CO"/>
           </a:p>
@@ -1236,7 +1246,7 @@
           <a:p>
             <a:fld id="{2EA38707-1077-4A4E-A639-4D8934A136F8}" type="datetimeFigureOut">
               <a:rPr lang="es-CO" smtClean="0"/>
-              <a:t>29/11/2021</a:t>
+              <a:t>02/12/2021</a:t>
             </a:fld>
             <a:endParaRPr lang="es-CO"/>
           </a:p>
@@ -1603,7 +1613,7 @@
           <a:p>
             <a:fld id="{2EA38707-1077-4A4E-A639-4D8934A136F8}" type="datetimeFigureOut">
               <a:rPr lang="es-CO" smtClean="0"/>
-              <a:t>29/11/2021</a:t>
+              <a:t>02/12/2021</a:t>
             </a:fld>
             <a:endParaRPr lang="es-CO"/>
           </a:p>
@@ -1721,7 +1731,7 @@
           <a:p>
             <a:fld id="{2EA38707-1077-4A4E-A639-4D8934A136F8}" type="datetimeFigureOut">
               <a:rPr lang="es-CO" smtClean="0"/>
-              <a:t>29/11/2021</a:t>
+              <a:t>02/12/2021</a:t>
             </a:fld>
             <a:endParaRPr lang="es-CO"/>
           </a:p>
@@ -1816,7 +1826,7 @@
           <a:p>
             <a:fld id="{2EA38707-1077-4A4E-A639-4D8934A136F8}" type="datetimeFigureOut">
               <a:rPr lang="es-CO" smtClean="0"/>
-              <a:t>29/11/2021</a:t>
+              <a:t>02/12/2021</a:t>
             </a:fld>
             <a:endParaRPr lang="es-CO"/>
           </a:p>
@@ -2093,7 +2103,7 @@
           <a:p>
             <a:fld id="{2EA38707-1077-4A4E-A639-4D8934A136F8}" type="datetimeFigureOut">
               <a:rPr lang="es-CO" smtClean="0"/>
-              <a:t>29/11/2021</a:t>
+              <a:t>02/12/2021</a:t>
             </a:fld>
             <a:endParaRPr lang="es-CO"/>
           </a:p>
@@ -2346,7 +2356,7 @@
           <a:p>
             <a:fld id="{2EA38707-1077-4A4E-A639-4D8934A136F8}" type="datetimeFigureOut">
               <a:rPr lang="es-CO" smtClean="0"/>
-              <a:t>29/11/2021</a:t>
+              <a:t>02/12/2021</a:t>
             </a:fld>
             <a:endParaRPr lang="es-CO"/>
           </a:p>
@@ -2559,7 +2569,7 @@
           <a:p>
             <a:fld id="{2EA38707-1077-4A4E-A639-4D8934A136F8}" type="datetimeFigureOut">
               <a:rPr lang="es-CO" smtClean="0"/>
-              <a:t>29/11/2021</a:t>
+              <a:t>02/12/2021</a:t>
             </a:fld>
             <a:endParaRPr lang="es-CO"/>
           </a:p>
@@ -2966,25 +2976,6 @@
       </p:grpSpPr>
       <p:sp>
         <p:nvSpPr>
-          <p:cNvPr id="2" name="Título 1"/>
-          <p:cNvSpPr>
-            <a:spLocks noGrp="1"/>
-          </p:cNvSpPr>
-          <p:nvPr>
-            <p:ph type="ctrTitle"/>
-          </p:nvPr>
-        </p:nvSpPr>
-        <p:spPr/>
-        <p:txBody>
-          <a:bodyPr/>
-          <a:lstStyle/>
-          <a:p>
-            <a:endParaRPr lang="es-CO"/>
-          </a:p>
-        </p:txBody>
-      </p:sp>
-      <p:sp>
-        <p:nvSpPr>
           <p:cNvPr id="3" name="Subtítulo 2"/>
           <p:cNvSpPr>
             <a:spLocks noGrp="1"/>
@@ -2993,12 +2984,47 @@
             <p:ph type="subTitle" idx="1"/>
           </p:nvPr>
         </p:nvSpPr>
-        <p:spPr/>
-        <p:txBody>
-          <a:bodyPr/>
-          <a:lstStyle/>
-          <a:p>
-            <a:endParaRPr lang="es-CO"/>
+        <p:spPr>
+          <a:xfrm>
+            <a:off x="9644742" y="87086"/>
+            <a:ext cx="2547258" cy="6770914"/>
+          </a:xfrm>
+        </p:spPr>
+        <p:txBody>
+          <a:bodyPr/>
+          <a:lstStyle/>
+          <a:p>
+            <a:r>
+              <a:rPr lang="es-CO" dirty="0" smtClean="0"/>
+              <a:t>Todo me funcionó a la perfección.</a:t>
+            </a:r>
+          </a:p>
+          <a:p>
+            <a:r>
+              <a:rPr lang="es-CO" dirty="0" smtClean="0"/>
+              <a:t>En </a:t>
+            </a:r>
+            <a:r>
+              <a:rPr lang="es-CO" dirty="0" err="1" smtClean="0"/>
+              <a:t>github</a:t>
+            </a:r>
+            <a:r>
+              <a:rPr lang="es-CO" dirty="0" smtClean="0"/>
+              <a:t> no encontraba los archivos le di en </a:t>
+            </a:r>
+            <a:r>
+              <a:rPr lang="es-CO" dirty="0" err="1" smtClean="0"/>
+              <a:t>branches</a:t>
+            </a:r>
+            <a:r>
+              <a:rPr lang="es-CO" dirty="0" smtClean="0"/>
+              <a:t> y aparecieron </a:t>
+            </a:r>
+            <a:r>
+              <a:rPr lang="es-CO" smtClean="0"/>
+              <a:t>en master</a:t>
+            </a:r>
+            <a:endParaRPr lang="es-CO" dirty="0"/>
           </a:p>
         </p:txBody>
       </p:sp>
@@ -3066,6 +3092,557 @@
     <p:extLst>
       <p:ext uri="{BB962C8B-B14F-4D97-AF65-F5344CB8AC3E}">
         <p14:creationId xmlns:p14="http://schemas.microsoft.com/office/powerpoint/2010/main" val="2132756074"/>
+      </p:ext>
+    </p:extLst>
+  </p:cSld>
+  <p:clrMapOvr>
+    <a:masterClrMapping/>
+  </p:clrMapOvr>
+  <p:timing>
+    <p:tnLst>
+      <p:par>
+        <p:cTn id="1" dur="indefinite" restart="never" nodeType="tmRoot"/>
+      </p:par>
+    </p:tnLst>
+  </p:timing>
+</p:sld>
+</file>
+
+<file path=ppt/slides/slide2.xml><?xml version="1.0" encoding="utf-8"?>
+<p:sld xmlns:a="http://schemas.openxmlformats.org/drawingml/2006/main" xmlns:r="http://schemas.openxmlformats.org/officeDocument/2006/relationships" xmlns:p="http://schemas.openxmlformats.org/presentationml/2006/main">
+  <p:cSld>
+    <p:spTree>
+      <p:nvGrpSpPr>
+        <p:cNvPr id="1" name=""/>
+        <p:cNvGrpSpPr/>
+        <p:nvPr/>
+      </p:nvGrpSpPr>
+      <p:grpSpPr>
+        <a:xfrm>
+          <a:off x="0" y="0"/>
+          <a:ext cx="0" cy="0"/>
+          <a:chOff x="0" y="0"/>
+          <a:chExt cx="0" cy="0"/>
+        </a:xfrm>
+      </p:grpSpPr>
+      <p:sp>
+        <p:nvSpPr>
+          <p:cNvPr id="2" name="Título 1"/>
+          <p:cNvSpPr>
+            <a:spLocks noGrp="1"/>
+          </p:cNvSpPr>
+          <p:nvPr>
+            <p:ph type="title"/>
+          </p:nvPr>
+        </p:nvSpPr>
+        <p:spPr/>
+        <p:txBody>
+          <a:bodyPr/>
+          <a:lstStyle/>
+          <a:p>
+            <a:r>
+              <a:rPr lang="es-CO" dirty="0" smtClean="0"/>
+              <a:t>Llaves </a:t>
+            </a:r>
+            <a:r>
+              <a:rPr lang="es-CO" dirty="0" err="1" smtClean="0"/>
+              <a:t>ssh</a:t>
+            </a:r>
+            <a:endParaRPr lang="es-CO" dirty="0"/>
+          </a:p>
+        </p:txBody>
+      </p:sp>
+      <p:sp>
+        <p:nvSpPr>
+          <p:cNvPr id="3" name="Marcador de contenido 2"/>
+          <p:cNvSpPr>
+            <a:spLocks noGrp="1"/>
+          </p:cNvSpPr>
+          <p:nvPr>
+            <p:ph idx="1"/>
+          </p:nvPr>
+        </p:nvSpPr>
+        <p:spPr/>
+        <p:txBody>
+          <a:bodyPr/>
+          <a:lstStyle/>
+          <a:p>
+            <a:r>
+              <a:rPr lang="es-CO" dirty="0" smtClean="0"/>
+              <a:t>El correo ya estaba el que era, viendo con </a:t>
+            </a:r>
+            <a:r>
+              <a:rPr lang="es-CO" dirty="0" err="1" smtClean="0"/>
+              <a:t>git</a:t>
+            </a:r>
+            <a:r>
+              <a:rPr lang="es-CO" dirty="0" smtClean="0"/>
+              <a:t> </a:t>
+            </a:r>
+            <a:r>
+              <a:rPr lang="es-CO" dirty="0" err="1" smtClean="0"/>
+              <a:t>config</a:t>
+            </a:r>
+            <a:r>
+              <a:rPr lang="es-CO" dirty="0" smtClean="0"/>
+              <a:t> -l</a:t>
+            </a:r>
+            <a:endParaRPr lang="es-CO" dirty="0"/>
+          </a:p>
+        </p:txBody>
+      </p:sp>
+    </p:spTree>
+    <p:extLst>
+      <p:ext uri="{BB962C8B-B14F-4D97-AF65-F5344CB8AC3E}">
+        <p14:creationId xmlns:p14="http://schemas.microsoft.com/office/powerpoint/2010/main" val="1220811313"/>
+      </p:ext>
+    </p:extLst>
+  </p:cSld>
+  <p:clrMapOvr>
+    <a:masterClrMapping/>
+  </p:clrMapOvr>
+  <p:timing>
+    <p:tnLst>
+      <p:par>
+        <p:cTn id="1" dur="indefinite" restart="never" nodeType="tmRoot"/>
+      </p:par>
+    </p:tnLst>
+  </p:timing>
+</p:sld>
+</file>
+
+<file path=ppt/slides/slide3.xml><?xml version="1.0" encoding="utf-8"?>
+<p:sld xmlns:a="http://schemas.openxmlformats.org/drawingml/2006/main" xmlns:r="http://schemas.openxmlformats.org/officeDocument/2006/relationships" xmlns:p="http://schemas.openxmlformats.org/presentationml/2006/main">
+  <p:cSld>
+    <p:spTree>
+      <p:nvGrpSpPr>
+        <p:cNvPr id="1" name=""/>
+        <p:cNvGrpSpPr/>
+        <p:nvPr/>
+      </p:nvGrpSpPr>
+      <p:grpSpPr>
+        <a:xfrm>
+          <a:off x="0" y="0"/>
+          <a:ext cx="0" cy="0"/>
+          <a:chOff x="0" y="0"/>
+          <a:chExt cx="0" cy="0"/>
+        </a:xfrm>
+      </p:grpSpPr>
+      <p:sp>
+        <p:nvSpPr>
+          <p:cNvPr id="2" name="Título 1"/>
+          <p:cNvSpPr>
+            <a:spLocks noGrp="1"/>
+          </p:cNvSpPr>
+          <p:nvPr>
+            <p:ph type="title"/>
+          </p:nvPr>
+        </p:nvSpPr>
+        <p:spPr/>
+        <p:txBody>
+          <a:bodyPr/>
+          <a:lstStyle/>
+          <a:p>
+            <a:endParaRPr lang="es-CO"/>
+          </a:p>
+        </p:txBody>
+      </p:sp>
+      <p:pic>
+        <p:nvPicPr>
+          <p:cNvPr id="5" name="Imagen 4" descr="MINGW64:/c/Users/personal"/>
+          <p:cNvPicPr>
+            <a:picLocks noChangeAspect="1"/>
+          </p:cNvPicPr>
+          <p:nvPr/>
+        </p:nvPicPr>
+        <p:blipFill>
+          <a:blip r:embed="rId2">
+            <a:extLst>
+              <a:ext uri="{28A0092B-C50C-407E-A947-70E740481C1C}">
+                <a14:useLocalDpi xmlns:a14="http://schemas.microsoft.com/office/drawing/2010/main" val="0"/>
+              </a:ext>
+            </a:extLst>
+          </a:blip>
+          <a:stretch>
+            <a:fillRect/>
+          </a:stretch>
+        </p:blipFill>
+        <p:spPr>
+          <a:xfrm>
+            <a:off x="0" y="0"/>
+            <a:ext cx="5613991" cy="6858000"/>
+          </a:xfrm>
+          <a:prstGeom prst="rect">
+            <a:avLst/>
+          </a:prstGeom>
+        </p:spPr>
+      </p:pic>
+      <p:pic>
+        <p:nvPicPr>
+          <p:cNvPr id="7" name="Marcador de contenido 6" descr="MINGW64:/c/Users/personal"/>
+          <p:cNvPicPr>
+            <a:picLocks noGrp="1" noChangeAspect="1"/>
+          </p:cNvPicPr>
+          <p:nvPr>
+            <p:ph idx="1"/>
+          </p:nvPr>
+        </p:nvPicPr>
+        <p:blipFill>
+          <a:blip r:embed="rId3">
+            <a:extLst>
+              <a:ext uri="{28A0092B-C50C-407E-A947-70E740481C1C}">
+                <a14:useLocalDpi xmlns:a14="http://schemas.microsoft.com/office/drawing/2010/main" val="0"/>
+              </a:ext>
+            </a:extLst>
+          </a:blip>
+          <a:stretch>
+            <a:fillRect/>
+          </a:stretch>
+        </p:blipFill>
+        <p:spPr>
+          <a:xfrm>
+            <a:off x="5613991" y="0"/>
+            <a:ext cx="5613990" cy="6858000"/>
+          </a:xfrm>
+        </p:spPr>
+      </p:pic>
+    </p:spTree>
+    <p:extLst>
+      <p:ext uri="{BB962C8B-B14F-4D97-AF65-F5344CB8AC3E}">
+        <p14:creationId xmlns:p14="http://schemas.microsoft.com/office/powerpoint/2010/main" val="3912904418"/>
+      </p:ext>
+    </p:extLst>
+  </p:cSld>
+  <p:clrMapOvr>
+    <a:masterClrMapping/>
+  </p:clrMapOvr>
+  <p:timing>
+    <p:tnLst>
+      <p:par>
+        <p:cTn id="1" dur="indefinite" restart="never" nodeType="tmRoot"/>
+      </p:par>
+    </p:tnLst>
+  </p:timing>
+</p:sld>
+</file>
+
+<file path=ppt/slides/slide4.xml><?xml version="1.0" encoding="utf-8"?>
+<p:sld xmlns:a="http://schemas.openxmlformats.org/drawingml/2006/main" xmlns:r="http://schemas.openxmlformats.org/officeDocument/2006/relationships" xmlns:p="http://schemas.openxmlformats.org/presentationml/2006/main">
+  <p:cSld>
+    <p:spTree>
+      <p:nvGrpSpPr>
+        <p:cNvPr id="1" name=""/>
+        <p:cNvGrpSpPr/>
+        <p:nvPr/>
+      </p:nvGrpSpPr>
+      <p:grpSpPr>
+        <a:xfrm>
+          <a:off x="0" y="0"/>
+          <a:ext cx="0" cy="0"/>
+          <a:chOff x="0" y="0"/>
+          <a:chExt cx="0" cy="0"/>
+        </a:xfrm>
+      </p:grpSpPr>
+      <p:sp>
+        <p:nvSpPr>
+          <p:cNvPr id="2" name="Título 1"/>
+          <p:cNvSpPr>
+            <a:spLocks noGrp="1"/>
+          </p:cNvSpPr>
+          <p:nvPr>
+            <p:ph type="title"/>
+          </p:nvPr>
+        </p:nvSpPr>
+        <p:spPr/>
+        <p:txBody>
+          <a:bodyPr/>
+          <a:lstStyle/>
+          <a:p>
+            <a:endParaRPr lang="es-CO"/>
+          </a:p>
+        </p:txBody>
+      </p:sp>
+      <p:pic>
+        <p:nvPicPr>
+          <p:cNvPr id="4" name="Marcador de contenido 3" descr=".ssh"/>
+          <p:cNvPicPr>
+            <a:picLocks noGrp="1" noChangeAspect="1"/>
+          </p:cNvPicPr>
+          <p:nvPr>
+            <p:ph idx="1"/>
+          </p:nvPr>
+        </p:nvPicPr>
+        <p:blipFill>
+          <a:blip r:embed="rId2">
+            <a:extLst>
+              <a:ext uri="{28A0092B-C50C-407E-A947-70E740481C1C}">
+                <a14:useLocalDpi xmlns:a14="http://schemas.microsoft.com/office/drawing/2010/main" val="0"/>
+              </a:ext>
+            </a:extLst>
+          </a:blip>
+          <a:stretch>
+            <a:fillRect/>
+          </a:stretch>
+        </p:blipFill>
+        <p:spPr>
+          <a:xfrm>
+            <a:off x="3560609" y="1825625"/>
+            <a:ext cx="5070782" cy="4351338"/>
+          </a:xfrm>
+        </p:spPr>
+      </p:pic>
+    </p:spTree>
+    <p:extLst>
+      <p:ext uri="{BB962C8B-B14F-4D97-AF65-F5344CB8AC3E}">
+        <p14:creationId xmlns:p14="http://schemas.microsoft.com/office/powerpoint/2010/main" val="795355840"/>
+      </p:ext>
+    </p:extLst>
+  </p:cSld>
+  <p:clrMapOvr>
+    <a:masterClrMapping/>
+  </p:clrMapOvr>
+  <p:timing>
+    <p:tnLst>
+      <p:par>
+        <p:cTn id="1" dur="indefinite" restart="never" nodeType="tmRoot"/>
+      </p:par>
+    </p:tnLst>
+  </p:timing>
+</p:sld>
+</file>
+
+<file path=ppt/slides/slide5.xml><?xml version="1.0" encoding="utf-8"?>
+<p:sld xmlns:a="http://schemas.openxmlformats.org/drawingml/2006/main" xmlns:r="http://schemas.openxmlformats.org/officeDocument/2006/relationships" xmlns:p="http://schemas.openxmlformats.org/presentationml/2006/main">
+  <p:cSld>
+    <p:spTree>
+      <p:nvGrpSpPr>
+        <p:cNvPr id="1" name=""/>
+        <p:cNvGrpSpPr/>
+        <p:nvPr/>
+      </p:nvGrpSpPr>
+      <p:grpSpPr>
+        <a:xfrm>
+          <a:off x="0" y="0"/>
+          <a:ext cx="0" cy="0"/>
+          <a:chOff x="0" y="0"/>
+          <a:chExt cx="0" cy="0"/>
+        </a:xfrm>
+      </p:grpSpPr>
+      <p:sp>
+        <p:nvSpPr>
+          <p:cNvPr id="2" name="Título 1"/>
+          <p:cNvSpPr>
+            <a:spLocks noGrp="1"/>
+          </p:cNvSpPr>
+          <p:nvPr>
+            <p:ph type="title"/>
+          </p:nvPr>
+        </p:nvSpPr>
+        <p:spPr/>
+        <p:txBody>
+          <a:bodyPr/>
+          <a:lstStyle/>
+          <a:p>
+            <a:r>
+              <a:rPr lang="es-CO" dirty="0" smtClean="0"/>
+              <a:t>Conectando a </a:t>
+            </a:r>
+            <a:r>
+              <a:rPr lang="es-CO" dirty="0" err="1" smtClean="0"/>
+              <a:t>git</a:t>
+            </a:r>
+            <a:r>
+              <a:rPr lang="es-CO" dirty="0" smtClean="0"/>
+              <a:t> </a:t>
+            </a:r>
+            <a:r>
+              <a:rPr lang="es-CO" dirty="0" err="1" smtClean="0"/>
+              <a:t>hub</a:t>
+            </a:r>
+            <a:r>
+              <a:rPr lang="es-CO" dirty="0" smtClean="0"/>
+              <a:t>	</a:t>
+            </a:r>
+            <a:endParaRPr lang="es-CO" dirty="0"/>
+          </a:p>
+        </p:txBody>
+      </p:sp>
+      <p:sp>
+        <p:nvSpPr>
+          <p:cNvPr id="3" name="Marcador de contenido 2"/>
+          <p:cNvSpPr>
+            <a:spLocks noGrp="1"/>
+          </p:cNvSpPr>
+          <p:nvPr>
+            <p:ph idx="1"/>
+          </p:nvPr>
+        </p:nvSpPr>
+        <p:spPr/>
+        <p:txBody>
+          <a:bodyPr/>
+          <a:lstStyle/>
+          <a:p>
+            <a:r>
+              <a:rPr lang="es-CO" dirty="0" err="1" smtClean="0"/>
+              <a:t>Settings</a:t>
+            </a:r>
+            <a:r>
+              <a:rPr lang="es-CO" dirty="0" smtClean="0"/>
+              <a:t> agregar SSH GPG</a:t>
+            </a:r>
+          </a:p>
+          <a:p>
+            <a:r>
+              <a:rPr lang="es-CO" dirty="0" err="1" smtClean="0"/>
+              <a:t>Alli</a:t>
+            </a:r>
+            <a:r>
+              <a:rPr lang="es-CO" dirty="0" smtClean="0"/>
+              <a:t> se pega la llave privada contenida en </a:t>
+            </a:r>
+            <a:r>
+              <a:rPr lang="es-CO" dirty="0" err="1" smtClean="0"/>
+              <a:t>id_rsa</a:t>
+            </a:r>
+            <a:endParaRPr lang="es-CO" dirty="0"/>
+          </a:p>
+        </p:txBody>
+      </p:sp>
+    </p:spTree>
+    <p:extLst>
+      <p:ext uri="{BB962C8B-B14F-4D97-AF65-F5344CB8AC3E}">
+        <p14:creationId xmlns:p14="http://schemas.microsoft.com/office/powerpoint/2010/main" val="3622136010"/>
+      </p:ext>
+    </p:extLst>
+  </p:cSld>
+  <p:clrMapOvr>
+    <a:masterClrMapping/>
+  </p:clrMapOvr>
+  <p:timing>
+    <p:tnLst>
+      <p:par>
+        <p:cTn id="1" dur="indefinite" restart="never" nodeType="tmRoot"/>
+      </p:par>
+    </p:tnLst>
+  </p:timing>
+</p:sld>
+</file>
+
+<file path=ppt/slides/slide6.xml><?xml version="1.0" encoding="utf-8"?>
+<p:sld xmlns:a="http://schemas.openxmlformats.org/drawingml/2006/main" xmlns:r="http://schemas.openxmlformats.org/officeDocument/2006/relationships" xmlns:p="http://schemas.openxmlformats.org/presentationml/2006/main">
+  <p:cSld>
+    <p:spTree>
+      <p:nvGrpSpPr>
+        <p:cNvPr id="1" name=""/>
+        <p:cNvGrpSpPr/>
+        <p:nvPr/>
+      </p:nvGrpSpPr>
+      <p:grpSpPr>
+        <a:xfrm>
+          <a:off x="0" y="0"/>
+          <a:ext cx="0" cy="0"/>
+          <a:chOff x="0" y="0"/>
+          <a:chExt cx="0" cy="0"/>
+        </a:xfrm>
+      </p:grpSpPr>
+      <p:sp>
+        <p:nvSpPr>
+          <p:cNvPr id="2" name="Título 1"/>
+          <p:cNvSpPr>
+            <a:spLocks noGrp="1"/>
+          </p:cNvSpPr>
+          <p:nvPr>
+            <p:ph type="title"/>
+          </p:nvPr>
+        </p:nvSpPr>
+        <p:spPr/>
+        <p:txBody>
+          <a:bodyPr/>
+          <a:lstStyle/>
+          <a:p>
+            <a:endParaRPr lang="es-CO"/>
+          </a:p>
+        </p:txBody>
+      </p:sp>
+      <p:pic>
+        <p:nvPicPr>
+          <p:cNvPr id="6" name="Marcador de contenido 5" descr="Jefferson-Benavides/hyperblog: Un blog increible para el curso de Git y GitHub de Platzi - Google Chrome"/>
+          <p:cNvPicPr>
+            <a:picLocks noGrp="1" noChangeAspect="1"/>
+          </p:cNvPicPr>
+          <p:nvPr>
+            <p:ph idx="1"/>
+          </p:nvPr>
+        </p:nvPicPr>
+        <p:blipFill>
+          <a:blip r:embed="rId2">
+            <a:extLst>
+              <a:ext uri="{28A0092B-C50C-407E-A947-70E740481C1C}">
+                <a14:useLocalDpi xmlns:a14="http://schemas.microsoft.com/office/drawing/2010/main" val="0"/>
+              </a:ext>
+            </a:extLst>
+          </a:blip>
+          <a:stretch>
+            <a:fillRect/>
+          </a:stretch>
+        </p:blipFill>
+        <p:spPr>
+          <a:xfrm>
+            <a:off x="0" y="0"/>
+            <a:ext cx="9376036" cy="6858000"/>
+          </a:xfrm>
+        </p:spPr>
+      </p:pic>
+      <p:sp>
+        <p:nvSpPr>
+          <p:cNvPr id="8" name="Elipse 7"/>
+          <p:cNvSpPr/>
+          <p:nvPr/>
+        </p:nvSpPr>
+        <p:spPr>
+          <a:xfrm>
+            <a:off x="3331029" y="3439886"/>
+            <a:ext cx="283028" cy="293914"/>
+          </a:xfrm>
+          <a:prstGeom prst="ellipse">
+            <a:avLst/>
+          </a:prstGeom>
+          <a:noFill/>
+          <a:ln w="38100">
+            <a:solidFill>
+              <a:srgbClr val="92D050"/>
+            </a:solidFill>
+          </a:ln>
+        </p:spPr>
+        <p:style>
+          <a:lnRef idx="2">
+            <a:schemeClr val="accent1">
+              <a:shade val="50000"/>
+            </a:schemeClr>
+          </a:lnRef>
+          <a:fillRef idx="1">
+            <a:schemeClr val="accent1"/>
+          </a:fillRef>
+          <a:effectRef idx="0">
+            <a:schemeClr val="accent1"/>
+          </a:effectRef>
+          <a:fontRef idx="minor">
+            <a:schemeClr val="lt1"/>
+          </a:fontRef>
+        </p:style>
+        <p:txBody>
+          <a:bodyPr rtlCol="0" anchor="ctr"/>
+          <a:lstStyle/>
+          <a:p>
+            <a:pPr algn="ctr"/>
+            <a:endParaRPr lang="es-CO"/>
+          </a:p>
+        </p:txBody>
+      </p:sp>
+    </p:spTree>
+    <p:extLst>
+      <p:ext uri="{BB962C8B-B14F-4D97-AF65-F5344CB8AC3E}">
+        <p14:creationId xmlns:p14="http://schemas.microsoft.com/office/powerpoint/2010/main" val="56085177"/>
       </p:ext>
     </p:extLst>
   </p:cSld>

</xml_diff>

<commit_message>
Archivo clases power point
</commit_message>
<xml_diff>
--- a/clases.pptx
+++ b/clases.pptx
@@ -11,6 +11,14 @@
     <p:sldId id="259" r:id="rId5"/>
     <p:sldId id="260" r:id="rId6"/>
     <p:sldId id="261" r:id="rId7"/>
+    <p:sldId id="262" r:id="rId8"/>
+    <p:sldId id="263" r:id="rId9"/>
+    <p:sldId id="264" r:id="rId10"/>
+    <p:sldId id="265" r:id="rId11"/>
+    <p:sldId id="266" r:id="rId12"/>
+    <p:sldId id="267" r:id="rId13"/>
+    <p:sldId id="269" r:id="rId14"/>
+    <p:sldId id="268" r:id="rId15"/>
   </p:sldIdLst>
   <p:sldSz cx="12192000" cy="6858000"/>
   <p:notesSz cx="6858000" cy="9144000"/>
@@ -248,7 +256,7 @@
           <a:p>
             <a:fld id="{2EA38707-1077-4A4E-A639-4D8934A136F8}" type="datetimeFigureOut">
               <a:rPr lang="es-CO" smtClean="0"/>
-              <a:t>02/12/2021</a:t>
+              <a:t>05/12/2021</a:t>
             </a:fld>
             <a:endParaRPr lang="es-CO"/>
           </a:p>
@@ -418,7 +426,7 @@
           <a:p>
             <a:fld id="{2EA38707-1077-4A4E-A639-4D8934A136F8}" type="datetimeFigureOut">
               <a:rPr lang="es-CO" smtClean="0"/>
-              <a:t>02/12/2021</a:t>
+              <a:t>05/12/2021</a:t>
             </a:fld>
             <a:endParaRPr lang="es-CO"/>
           </a:p>
@@ -598,7 +606,7 @@
           <a:p>
             <a:fld id="{2EA38707-1077-4A4E-A639-4D8934A136F8}" type="datetimeFigureOut">
               <a:rPr lang="es-CO" smtClean="0"/>
-              <a:t>02/12/2021</a:t>
+              <a:t>05/12/2021</a:t>
             </a:fld>
             <a:endParaRPr lang="es-CO"/>
           </a:p>
@@ -768,7 +776,7 @@
           <a:p>
             <a:fld id="{2EA38707-1077-4A4E-A639-4D8934A136F8}" type="datetimeFigureOut">
               <a:rPr lang="es-CO" smtClean="0"/>
-              <a:t>02/12/2021</a:t>
+              <a:t>05/12/2021</a:t>
             </a:fld>
             <a:endParaRPr lang="es-CO"/>
           </a:p>
@@ -1014,7 +1022,7 @@
           <a:p>
             <a:fld id="{2EA38707-1077-4A4E-A639-4D8934A136F8}" type="datetimeFigureOut">
               <a:rPr lang="es-CO" smtClean="0"/>
-              <a:t>02/12/2021</a:t>
+              <a:t>05/12/2021</a:t>
             </a:fld>
             <a:endParaRPr lang="es-CO"/>
           </a:p>
@@ -1246,7 +1254,7 @@
           <a:p>
             <a:fld id="{2EA38707-1077-4A4E-A639-4D8934A136F8}" type="datetimeFigureOut">
               <a:rPr lang="es-CO" smtClean="0"/>
-              <a:t>02/12/2021</a:t>
+              <a:t>05/12/2021</a:t>
             </a:fld>
             <a:endParaRPr lang="es-CO"/>
           </a:p>
@@ -1613,7 +1621,7 @@
           <a:p>
             <a:fld id="{2EA38707-1077-4A4E-A639-4D8934A136F8}" type="datetimeFigureOut">
               <a:rPr lang="es-CO" smtClean="0"/>
-              <a:t>02/12/2021</a:t>
+              <a:t>05/12/2021</a:t>
             </a:fld>
             <a:endParaRPr lang="es-CO"/>
           </a:p>
@@ -1731,7 +1739,7 @@
           <a:p>
             <a:fld id="{2EA38707-1077-4A4E-A639-4D8934A136F8}" type="datetimeFigureOut">
               <a:rPr lang="es-CO" smtClean="0"/>
-              <a:t>02/12/2021</a:t>
+              <a:t>05/12/2021</a:t>
             </a:fld>
             <a:endParaRPr lang="es-CO"/>
           </a:p>
@@ -1826,7 +1834,7 @@
           <a:p>
             <a:fld id="{2EA38707-1077-4A4E-A639-4D8934A136F8}" type="datetimeFigureOut">
               <a:rPr lang="es-CO" smtClean="0"/>
-              <a:t>02/12/2021</a:t>
+              <a:t>05/12/2021</a:t>
             </a:fld>
             <a:endParaRPr lang="es-CO"/>
           </a:p>
@@ -2103,7 +2111,7 @@
           <a:p>
             <a:fld id="{2EA38707-1077-4A4E-A639-4D8934A136F8}" type="datetimeFigureOut">
               <a:rPr lang="es-CO" smtClean="0"/>
-              <a:t>02/12/2021</a:t>
+              <a:t>05/12/2021</a:t>
             </a:fld>
             <a:endParaRPr lang="es-CO"/>
           </a:p>
@@ -2356,7 +2364,7 @@
           <a:p>
             <a:fld id="{2EA38707-1077-4A4E-A639-4D8934A136F8}" type="datetimeFigureOut">
               <a:rPr lang="es-CO" smtClean="0"/>
-              <a:t>02/12/2021</a:t>
+              <a:t>05/12/2021</a:t>
             </a:fld>
             <a:endParaRPr lang="es-CO"/>
           </a:p>
@@ -2569,7 +2577,7 @@
           <a:p>
             <a:fld id="{2EA38707-1077-4A4E-A639-4D8934A136F8}" type="datetimeFigureOut">
               <a:rPr lang="es-CO" smtClean="0"/>
-              <a:t>02/12/2021</a:t>
+              <a:t>05/12/2021</a:t>
             </a:fld>
             <a:endParaRPr lang="es-CO"/>
           </a:p>
@@ -3108,6 +3116,550 @@
 </p:sld>
 </file>
 
+<file path=ppt/slides/slide10.xml><?xml version="1.0" encoding="utf-8"?>
+<p:sld xmlns:a="http://schemas.openxmlformats.org/drawingml/2006/main" xmlns:r="http://schemas.openxmlformats.org/officeDocument/2006/relationships" xmlns:p="http://schemas.openxmlformats.org/presentationml/2006/main">
+  <p:cSld>
+    <p:spTree>
+      <p:nvGrpSpPr>
+        <p:cNvPr id="1" name=""/>
+        <p:cNvGrpSpPr/>
+        <p:nvPr/>
+      </p:nvGrpSpPr>
+      <p:grpSpPr>
+        <a:xfrm>
+          <a:off x="0" y="0"/>
+          <a:ext cx="0" cy="0"/>
+          <a:chOff x="0" y="0"/>
+          <a:chExt cx="0" cy="0"/>
+        </a:xfrm>
+      </p:grpSpPr>
+      <p:sp>
+        <p:nvSpPr>
+          <p:cNvPr id="2" name="Título 1"/>
+          <p:cNvSpPr>
+            <a:spLocks noGrp="1"/>
+          </p:cNvSpPr>
+          <p:nvPr>
+            <p:ph type="title"/>
+          </p:nvPr>
+        </p:nvSpPr>
+        <p:spPr/>
+        <p:txBody>
+          <a:bodyPr>
+            <a:normAutofit/>
+          </a:bodyPr>
+          <a:lstStyle/>
+          <a:p>
+            <a:endParaRPr lang="es-CO" dirty="0"/>
+          </a:p>
+        </p:txBody>
+      </p:sp>
+    </p:spTree>
+    <p:extLst>
+      <p:ext uri="{BB962C8B-B14F-4D97-AF65-F5344CB8AC3E}">
+        <p14:creationId xmlns:p14="http://schemas.microsoft.com/office/powerpoint/2010/main" val="1521256252"/>
+      </p:ext>
+    </p:extLst>
+  </p:cSld>
+  <p:clrMapOvr>
+    <a:masterClrMapping/>
+  </p:clrMapOvr>
+  <p:timing>
+    <p:tnLst>
+      <p:par>
+        <p:cTn id="1" dur="indefinite" restart="never" nodeType="tmRoot"/>
+      </p:par>
+    </p:tnLst>
+  </p:timing>
+</p:sld>
+</file>
+
+<file path=ppt/slides/slide11.xml><?xml version="1.0" encoding="utf-8"?>
+<p:sld xmlns:a="http://schemas.openxmlformats.org/drawingml/2006/main" xmlns:r="http://schemas.openxmlformats.org/officeDocument/2006/relationships" xmlns:p="http://schemas.openxmlformats.org/presentationml/2006/main">
+  <p:cSld>
+    <p:spTree>
+      <p:nvGrpSpPr>
+        <p:cNvPr id="1" name=""/>
+        <p:cNvGrpSpPr/>
+        <p:nvPr/>
+      </p:nvGrpSpPr>
+      <p:grpSpPr>
+        <a:xfrm>
+          <a:off x="0" y="0"/>
+          <a:ext cx="0" cy="0"/>
+          <a:chOff x="0" y="0"/>
+          <a:chExt cx="0" cy="0"/>
+        </a:xfrm>
+      </p:grpSpPr>
+      <p:sp>
+        <p:nvSpPr>
+          <p:cNvPr id="2" name="Título 1"/>
+          <p:cNvSpPr>
+            <a:spLocks noGrp="1"/>
+          </p:cNvSpPr>
+          <p:nvPr>
+            <p:ph type="title"/>
+          </p:nvPr>
+        </p:nvSpPr>
+        <p:spPr/>
+        <p:txBody>
+          <a:bodyPr/>
+          <a:lstStyle/>
+          <a:p>
+            <a:endParaRPr lang="es-CO"/>
+          </a:p>
+        </p:txBody>
+      </p:sp>
+      <p:pic>
+        <p:nvPicPr>
+          <p:cNvPr id="4" name="Marcador de contenido 3" descr="MINGW64:/e/dev/platzi/proyecto1"/>
+          <p:cNvPicPr>
+            <a:picLocks noGrp="1" noChangeAspect="1"/>
+          </p:cNvPicPr>
+          <p:nvPr>
+            <p:ph idx="1"/>
+          </p:nvPr>
+        </p:nvPicPr>
+        <p:blipFill>
+          <a:blip r:embed="rId2">
+            <a:extLst>
+              <a:ext uri="{28A0092B-C50C-407E-A947-70E740481C1C}">
+                <a14:useLocalDpi xmlns:a14="http://schemas.microsoft.com/office/drawing/2010/main" val="0"/>
+              </a:ext>
+            </a:extLst>
+          </a:blip>
+          <a:stretch>
+            <a:fillRect/>
+          </a:stretch>
+        </p:blipFill>
+        <p:spPr>
+          <a:xfrm>
+            <a:off x="-1" y="0"/>
+            <a:ext cx="5390707" cy="6858000"/>
+          </a:xfrm>
+        </p:spPr>
+      </p:pic>
+    </p:spTree>
+    <p:extLst>
+      <p:ext uri="{BB962C8B-B14F-4D97-AF65-F5344CB8AC3E}">
+        <p14:creationId xmlns:p14="http://schemas.microsoft.com/office/powerpoint/2010/main" val="610291999"/>
+      </p:ext>
+    </p:extLst>
+  </p:cSld>
+  <p:clrMapOvr>
+    <a:masterClrMapping/>
+  </p:clrMapOvr>
+  <p:timing>
+    <p:tnLst>
+      <p:par>
+        <p:cTn id="1" dur="indefinite" restart="never" nodeType="tmRoot"/>
+      </p:par>
+    </p:tnLst>
+  </p:timing>
+</p:sld>
+</file>
+
+<file path=ppt/slides/slide12.xml><?xml version="1.0" encoding="utf-8"?>
+<p:sld xmlns:a="http://schemas.openxmlformats.org/drawingml/2006/main" xmlns:r="http://schemas.openxmlformats.org/officeDocument/2006/relationships" xmlns:p="http://schemas.openxmlformats.org/presentationml/2006/main">
+  <p:cSld>
+    <p:spTree>
+      <p:nvGrpSpPr>
+        <p:cNvPr id="1" name=""/>
+        <p:cNvGrpSpPr/>
+        <p:nvPr/>
+      </p:nvGrpSpPr>
+      <p:grpSpPr>
+        <a:xfrm>
+          <a:off x="0" y="0"/>
+          <a:ext cx="0" cy="0"/>
+          <a:chOff x="0" y="0"/>
+          <a:chExt cx="0" cy="0"/>
+        </a:xfrm>
+      </p:grpSpPr>
+      <p:sp>
+        <p:nvSpPr>
+          <p:cNvPr id="2" name="Título 1"/>
+          <p:cNvSpPr>
+            <a:spLocks noGrp="1"/>
+          </p:cNvSpPr>
+          <p:nvPr>
+            <p:ph type="title"/>
+          </p:nvPr>
+        </p:nvSpPr>
+        <p:spPr/>
+        <p:txBody>
+          <a:bodyPr/>
+          <a:lstStyle/>
+          <a:p>
+            <a:r>
+              <a:rPr lang="es-CO" dirty="0" err="1" smtClean="0"/>
+              <a:t>tags</a:t>
+            </a:r>
+            <a:endParaRPr lang="es-CO" dirty="0"/>
+          </a:p>
+        </p:txBody>
+      </p:sp>
+      <p:sp>
+        <p:nvSpPr>
+          <p:cNvPr id="3" name="Marcador de contenido 2"/>
+          <p:cNvSpPr>
+            <a:spLocks noGrp="1"/>
+          </p:cNvSpPr>
+          <p:nvPr>
+            <p:ph idx="1"/>
+          </p:nvPr>
+        </p:nvSpPr>
+        <p:spPr/>
+        <p:txBody>
+          <a:bodyPr/>
+          <a:lstStyle/>
+          <a:p>
+            <a:endParaRPr lang="es-CO" dirty="0"/>
+          </a:p>
+        </p:txBody>
+      </p:sp>
+    </p:spTree>
+    <p:extLst>
+      <p:ext uri="{BB962C8B-B14F-4D97-AF65-F5344CB8AC3E}">
+        <p14:creationId xmlns:p14="http://schemas.microsoft.com/office/powerpoint/2010/main" val="1922206294"/>
+      </p:ext>
+    </p:extLst>
+  </p:cSld>
+  <p:clrMapOvr>
+    <a:masterClrMapping/>
+  </p:clrMapOvr>
+  <p:timing>
+    <p:tnLst>
+      <p:par>
+        <p:cTn id="1" dur="indefinite" restart="never" nodeType="tmRoot"/>
+      </p:par>
+    </p:tnLst>
+  </p:timing>
+</p:sld>
+</file>
+
+<file path=ppt/slides/slide13.xml><?xml version="1.0" encoding="utf-8"?>
+<p:sld xmlns:a="http://schemas.openxmlformats.org/drawingml/2006/main" xmlns:r="http://schemas.openxmlformats.org/officeDocument/2006/relationships" xmlns:p="http://schemas.openxmlformats.org/presentationml/2006/main">
+  <p:cSld>
+    <p:spTree>
+      <p:nvGrpSpPr>
+        <p:cNvPr id="1" name=""/>
+        <p:cNvGrpSpPr/>
+        <p:nvPr/>
+      </p:nvGrpSpPr>
+      <p:grpSpPr>
+        <a:xfrm>
+          <a:off x="0" y="0"/>
+          <a:ext cx="0" cy="0"/>
+          <a:chOff x="0" y="0"/>
+          <a:chExt cx="0" cy="0"/>
+        </a:xfrm>
+      </p:grpSpPr>
+      <p:sp>
+        <p:nvSpPr>
+          <p:cNvPr id="2" name="Título 1"/>
+          <p:cNvSpPr>
+            <a:spLocks noGrp="1"/>
+          </p:cNvSpPr>
+          <p:nvPr>
+            <p:ph type="title"/>
+          </p:nvPr>
+        </p:nvSpPr>
+        <p:spPr/>
+        <p:txBody>
+          <a:bodyPr/>
+          <a:lstStyle/>
+          <a:p>
+            <a:endParaRPr lang="es-CO"/>
+          </a:p>
+        </p:txBody>
+      </p:sp>
+      <p:pic>
+        <p:nvPicPr>
+          <p:cNvPr id="4" name="Marcador de contenido 3" descr="MINGW64:/e/dev/platzi/proyecto1"/>
+          <p:cNvPicPr>
+            <a:picLocks noGrp="1" noChangeAspect="1"/>
+          </p:cNvPicPr>
+          <p:nvPr>
+            <p:ph idx="1"/>
+          </p:nvPr>
+        </p:nvPicPr>
+        <p:blipFill>
+          <a:blip r:embed="rId2">
+            <a:extLst>
+              <a:ext uri="{28A0092B-C50C-407E-A947-70E740481C1C}">
+                <a14:useLocalDpi xmlns:a14="http://schemas.microsoft.com/office/drawing/2010/main" val="0"/>
+              </a:ext>
+            </a:extLst>
+          </a:blip>
+          <a:stretch>
+            <a:fillRect/>
+          </a:stretch>
+        </p:blipFill>
+        <p:spPr>
+          <a:xfrm>
+            <a:off x="0" y="0"/>
+            <a:ext cx="5138057" cy="6861382"/>
+          </a:xfrm>
+        </p:spPr>
+      </p:pic>
+      <p:pic>
+        <p:nvPicPr>
+          <p:cNvPr id="5" name="Imagen 4" descr="Jefferson-Benavides/hyperblog: Un blog increible para el curso de Git y GitHub de Platzi - Google Chrome"/>
+          <p:cNvPicPr>
+            <a:picLocks noChangeAspect="1"/>
+          </p:cNvPicPr>
+          <p:nvPr/>
+        </p:nvPicPr>
+        <p:blipFill>
+          <a:blip r:embed="rId3">
+            <a:extLst>
+              <a:ext uri="{28A0092B-C50C-407E-A947-70E740481C1C}">
+                <a14:useLocalDpi xmlns:a14="http://schemas.microsoft.com/office/drawing/2010/main" val="0"/>
+              </a:ext>
+            </a:extLst>
+          </a:blip>
+          <a:stretch>
+            <a:fillRect/>
+          </a:stretch>
+        </p:blipFill>
+        <p:spPr>
+          <a:xfrm>
+            <a:off x="5498874" y="0"/>
+            <a:ext cx="6801984" cy="6858000"/>
+          </a:xfrm>
+          <a:prstGeom prst="rect">
+            <a:avLst/>
+          </a:prstGeom>
+        </p:spPr>
+      </p:pic>
+      <p:sp>
+        <p:nvSpPr>
+          <p:cNvPr id="6" name="Elipse 5"/>
+          <p:cNvSpPr/>
+          <p:nvPr/>
+        </p:nvSpPr>
+        <p:spPr>
+          <a:xfrm>
+            <a:off x="5791199" y="2438398"/>
+            <a:ext cx="772886" cy="500743"/>
+          </a:xfrm>
+          <a:prstGeom prst="ellipse">
+            <a:avLst/>
+          </a:prstGeom>
+          <a:noFill/>
+          <a:ln w="28575">
+            <a:solidFill>
+              <a:srgbClr val="FF0000"/>
+            </a:solidFill>
+          </a:ln>
+        </p:spPr>
+        <p:style>
+          <a:lnRef idx="2">
+            <a:schemeClr val="accent1">
+              <a:shade val="50000"/>
+            </a:schemeClr>
+          </a:lnRef>
+          <a:fillRef idx="1">
+            <a:schemeClr val="accent1"/>
+          </a:fillRef>
+          <a:effectRef idx="0">
+            <a:schemeClr val="accent1"/>
+          </a:effectRef>
+          <a:fontRef idx="minor">
+            <a:schemeClr val="lt1"/>
+          </a:fontRef>
+        </p:style>
+        <p:txBody>
+          <a:bodyPr rtlCol="0" anchor="ctr"/>
+          <a:lstStyle/>
+          <a:p>
+            <a:pPr algn="ctr"/>
+            <a:endParaRPr lang="es-CO"/>
+          </a:p>
+        </p:txBody>
+      </p:sp>
+      <p:sp>
+        <p:nvSpPr>
+          <p:cNvPr id="7" name="Elipse 6"/>
+          <p:cNvSpPr/>
+          <p:nvPr/>
+        </p:nvSpPr>
+        <p:spPr>
+          <a:xfrm>
+            <a:off x="6487882" y="3537858"/>
+            <a:ext cx="576943" cy="386094"/>
+          </a:xfrm>
+          <a:prstGeom prst="ellipse">
+            <a:avLst/>
+          </a:prstGeom>
+          <a:noFill/>
+          <a:ln w="28575">
+            <a:solidFill>
+              <a:srgbClr val="FF0000"/>
+            </a:solidFill>
+          </a:ln>
+        </p:spPr>
+        <p:style>
+          <a:lnRef idx="2">
+            <a:schemeClr val="accent1">
+              <a:shade val="50000"/>
+            </a:schemeClr>
+          </a:lnRef>
+          <a:fillRef idx="1">
+            <a:schemeClr val="accent1"/>
+          </a:fillRef>
+          <a:effectRef idx="0">
+            <a:schemeClr val="accent1"/>
+          </a:effectRef>
+          <a:fontRef idx="minor">
+            <a:schemeClr val="lt1"/>
+          </a:fontRef>
+        </p:style>
+        <p:txBody>
+          <a:bodyPr rtlCol="0" anchor="ctr"/>
+          <a:lstStyle/>
+          <a:p>
+            <a:pPr algn="ctr"/>
+            <a:endParaRPr lang="es-CO"/>
+          </a:p>
+        </p:txBody>
+      </p:sp>
+    </p:spTree>
+    <p:extLst>
+      <p:ext uri="{BB962C8B-B14F-4D97-AF65-F5344CB8AC3E}">
+        <p14:creationId xmlns:p14="http://schemas.microsoft.com/office/powerpoint/2010/main" val="2108137766"/>
+      </p:ext>
+    </p:extLst>
+  </p:cSld>
+  <p:clrMapOvr>
+    <a:masterClrMapping/>
+  </p:clrMapOvr>
+  <p:timing>
+    <p:tnLst>
+      <p:par>
+        <p:cTn id="1" dur="indefinite" restart="never" nodeType="tmRoot"/>
+      </p:par>
+    </p:tnLst>
+  </p:timing>
+</p:sld>
+</file>
+
+<file path=ppt/slides/slide14.xml><?xml version="1.0" encoding="utf-8"?>
+<p:sld xmlns:a="http://schemas.openxmlformats.org/drawingml/2006/main" xmlns:r="http://schemas.openxmlformats.org/officeDocument/2006/relationships" xmlns:p="http://schemas.openxmlformats.org/presentationml/2006/main">
+  <p:cSld>
+    <p:spTree>
+      <p:nvGrpSpPr>
+        <p:cNvPr id="1" name=""/>
+        <p:cNvGrpSpPr/>
+        <p:nvPr/>
+      </p:nvGrpSpPr>
+      <p:grpSpPr>
+        <a:xfrm>
+          <a:off x="0" y="0"/>
+          <a:ext cx="0" cy="0"/>
+          <a:chOff x="0" y="0"/>
+          <a:chExt cx="0" cy="0"/>
+        </a:xfrm>
+      </p:grpSpPr>
+      <p:sp>
+        <p:nvSpPr>
+          <p:cNvPr id="2" name="Título 1"/>
+          <p:cNvSpPr>
+            <a:spLocks noGrp="1"/>
+          </p:cNvSpPr>
+          <p:nvPr>
+            <p:ph type="title"/>
+          </p:nvPr>
+        </p:nvSpPr>
+        <p:spPr/>
+        <p:txBody>
+          <a:bodyPr/>
+          <a:lstStyle/>
+          <a:p>
+            <a:endParaRPr lang="es-CO"/>
+          </a:p>
+        </p:txBody>
+      </p:sp>
+      <p:pic>
+        <p:nvPicPr>
+          <p:cNvPr id="4" name="Marcador de contenido 3" descr="MINGW64:/e/dev/platzi/proyecto1"/>
+          <p:cNvPicPr>
+            <a:picLocks noGrp="1" noChangeAspect="1"/>
+          </p:cNvPicPr>
+          <p:nvPr>
+            <p:ph idx="1"/>
+          </p:nvPr>
+        </p:nvPicPr>
+        <p:blipFill>
+          <a:blip r:embed="rId2">
+            <a:extLst>
+              <a:ext uri="{28A0092B-C50C-407E-A947-70E740481C1C}">
+                <a14:useLocalDpi xmlns:a14="http://schemas.microsoft.com/office/drawing/2010/main" val="0"/>
+              </a:ext>
+            </a:extLst>
+          </a:blip>
+          <a:stretch>
+            <a:fillRect/>
+          </a:stretch>
+        </p:blipFill>
+        <p:spPr>
+          <a:xfrm>
+            <a:off x="0" y="0"/>
+            <a:ext cx="5135524" cy="6858000"/>
+          </a:xfrm>
+        </p:spPr>
+      </p:pic>
+      <p:pic>
+        <p:nvPicPr>
+          <p:cNvPr id="5" name="Imagen 4" descr="MINGW64:/e/dev/platzi/proyecto1"/>
+          <p:cNvPicPr>
+            <a:picLocks noChangeAspect="1"/>
+          </p:cNvPicPr>
+          <p:nvPr/>
+        </p:nvPicPr>
+        <p:blipFill>
+          <a:blip r:embed="rId3">
+            <a:extLst>
+              <a:ext uri="{28A0092B-C50C-407E-A947-70E740481C1C}">
+                <a14:useLocalDpi xmlns:a14="http://schemas.microsoft.com/office/drawing/2010/main" val="0"/>
+              </a:ext>
+            </a:extLst>
+          </a:blip>
+          <a:stretch>
+            <a:fillRect/>
+          </a:stretch>
+        </p:blipFill>
+        <p:spPr>
+          <a:xfrm>
+            <a:off x="5444123" y="0"/>
+            <a:ext cx="5135526" cy="6858000"/>
+          </a:xfrm>
+          <a:prstGeom prst="rect">
+            <a:avLst/>
+          </a:prstGeom>
+        </p:spPr>
+      </p:pic>
+    </p:spTree>
+    <p:extLst>
+      <p:ext uri="{BB962C8B-B14F-4D97-AF65-F5344CB8AC3E}">
+        <p14:creationId xmlns:p14="http://schemas.microsoft.com/office/powerpoint/2010/main" val="2087829372"/>
+      </p:ext>
+    </p:extLst>
+  </p:cSld>
+  <p:clrMapOvr>
+    <a:masterClrMapping/>
+  </p:clrMapOvr>
+  <p:timing>
+    <p:tnLst>
+      <p:par>
+        <p:cTn id="1" dur="indefinite" restart="never" nodeType="tmRoot"/>
+      </p:par>
+    </p:tnLst>
+  </p:timing>
+</p:sld>
+</file>
+
 <file path=ppt/slides/slide2.xml><?xml version="1.0" encoding="utf-8"?>
 <p:sld xmlns:a="http://schemas.openxmlformats.org/drawingml/2006/main" xmlns:r="http://schemas.openxmlformats.org/officeDocument/2006/relationships" xmlns:p="http://schemas.openxmlformats.org/presentationml/2006/main">
   <p:cSld>
@@ -3643,6 +4195,285 @@
     <p:extLst>
       <p:ext uri="{BB962C8B-B14F-4D97-AF65-F5344CB8AC3E}">
         <p14:creationId xmlns:p14="http://schemas.microsoft.com/office/powerpoint/2010/main" val="56085177"/>
+      </p:ext>
+    </p:extLst>
+  </p:cSld>
+  <p:clrMapOvr>
+    <a:masterClrMapping/>
+  </p:clrMapOvr>
+  <p:timing>
+    <p:tnLst>
+      <p:par>
+        <p:cTn id="1" dur="indefinite" restart="never" nodeType="tmRoot"/>
+      </p:par>
+    </p:tnLst>
+  </p:timing>
+</p:sld>
+</file>
+
+<file path=ppt/slides/slide7.xml><?xml version="1.0" encoding="utf-8"?>
+<p:sld xmlns:a="http://schemas.openxmlformats.org/drawingml/2006/main" xmlns:r="http://schemas.openxmlformats.org/officeDocument/2006/relationships" xmlns:p="http://schemas.openxmlformats.org/presentationml/2006/main">
+  <p:cSld>
+    <p:spTree>
+      <p:nvGrpSpPr>
+        <p:cNvPr id="1" name=""/>
+        <p:cNvGrpSpPr/>
+        <p:nvPr/>
+      </p:nvGrpSpPr>
+      <p:grpSpPr>
+        <a:xfrm>
+          <a:off x="0" y="0"/>
+          <a:ext cx="0" cy="0"/>
+          <a:chOff x="0" y="0"/>
+          <a:chExt cx="0" cy="0"/>
+        </a:xfrm>
+      </p:grpSpPr>
+      <p:sp>
+        <p:nvSpPr>
+          <p:cNvPr id="2" name="Título 1"/>
+          <p:cNvSpPr>
+            <a:spLocks noGrp="1"/>
+          </p:cNvSpPr>
+          <p:nvPr>
+            <p:ph type="title"/>
+          </p:nvPr>
+        </p:nvSpPr>
+        <p:spPr/>
+        <p:txBody>
+          <a:bodyPr/>
+          <a:lstStyle/>
+          <a:p>
+            <a:endParaRPr lang="es-CO"/>
+          </a:p>
+        </p:txBody>
+      </p:sp>
+      <p:pic>
+        <p:nvPicPr>
+          <p:cNvPr id="4" name="Marcador de contenido 3" descr="MINGW64:/e/dev/platzi/proyecto1"/>
+          <p:cNvPicPr>
+            <a:picLocks noGrp="1" noChangeAspect="1"/>
+          </p:cNvPicPr>
+          <p:nvPr>
+            <p:ph idx="1"/>
+          </p:nvPr>
+        </p:nvPicPr>
+        <p:blipFill>
+          <a:blip r:embed="rId2">
+            <a:extLst>
+              <a:ext uri="{28A0092B-C50C-407E-A947-70E740481C1C}">
+                <a14:useLocalDpi xmlns:a14="http://schemas.microsoft.com/office/drawing/2010/main" val="0"/>
+              </a:ext>
+            </a:extLst>
+          </a:blip>
+          <a:stretch>
+            <a:fillRect/>
+          </a:stretch>
+        </p:blipFill>
+        <p:spPr>
+          <a:xfrm>
+            <a:off x="0" y="0"/>
+            <a:ext cx="5709506" cy="6945086"/>
+          </a:xfrm>
+        </p:spPr>
+      </p:pic>
+    </p:spTree>
+    <p:extLst>
+      <p:ext uri="{BB962C8B-B14F-4D97-AF65-F5344CB8AC3E}">
+        <p14:creationId xmlns:p14="http://schemas.microsoft.com/office/powerpoint/2010/main" val="1554562512"/>
+      </p:ext>
+    </p:extLst>
+  </p:cSld>
+  <p:clrMapOvr>
+    <a:masterClrMapping/>
+  </p:clrMapOvr>
+  <p:timing>
+    <p:tnLst>
+      <p:par>
+        <p:cTn id="1" dur="indefinite" restart="never" nodeType="tmRoot"/>
+      </p:par>
+    </p:tnLst>
+  </p:timing>
+</p:sld>
+</file>
+
+<file path=ppt/slides/slide8.xml><?xml version="1.0" encoding="utf-8"?>
+<p:sld xmlns:a="http://schemas.openxmlformats.org/drawingml/2006/main" xmlns:r="http://schemas.openxmlformats.org/officeDocument/2006/relationships" xmlns:p="http://schemas.openxmlformats.org/presentationml/2006/main">
+  <p:cSld>
+    <p:spTree>
+      <p:nvGrpSpPr>
+        <p:cNvPr id="1" name=""/>
+        <p:cNvGrpSpPr/>
+        <p:nvPr/>
+      </p:nvGrpSpPr>
+      <p:grpSpPr>
+        <a:xfrm>
+          <a:off x="0" y="0"/>
+          <a:ext cx="0" cy="0"/>
+          <a:chOff x="0" y="0"/>
+          <a:chExt cx="0" cy="0"/>
+        </a:xfrm>
+      </p:grpSpPr>
+      <p:sp>
+        <p:nvSpPr>
+          <p:cNvPr id="2" name="Título 1"/>
+          <p:cNvSpPr>
+            <a:spLocks noGrp="1"/>
+          </p:cNvSpPr>
+          <p:nvPr>
+            <p:ph type="title"/>
+          </p:nvPr>
+        </p:nvSpPr>
+        <p:spPr/>
+        <p:txBody>
+          <a:bodyPr/>
+          <a:lstStyle/>
+          <a:p>
+            <a:r>
+              <a:rPr lang="es-CO" dirty="0" smtClean="0"/>
+              <a:t>Probando con cambios en el proyecto</a:t>
+            </a:r>
+            <a:endParaRPr lang="es-CO" dirty="0"/>
+          </a:p>
+        </p:txBody>
+      </p:sp>
+      <p:sp>
+        <p:nvSpPr>
+          <p:cNvPr id="3" name="Marcador de contenido 2"/>
+          <p:cNvSpPr>
+            <a:spLocks noGrp="1"/>
+          </p:cNvSpPr>
+          <p:nvPr>
+            <p:ph idx="1"/>
+          </p:nvPr>
+        </p:nvSpPr>
+        <p:spPr/>
+        <p:txBody>
+          <a:bodyPr/>
+          <a:lstStyle/>
+          <a:p>
+            <a:endParaRPr lang="es-CO"/>
+          </a:p>
+        </p:txBody>
+      </p:sp>
+    </p:spTree>
+    <p:extLst>
+      <p:ext uri="{BB962C8B-B14F-4D97-AF65-F5344CB8AC3E}">
+        <p14:creationId xmlns:p14="http://schemas.microsoft.com/office/powerpoint/2010/main" val="1679381756"/>
+      </p:ext>
+    </p:extLst>
+  </p:cSld>
+  <p:clrMapOvr>
+    <a:masterClrMapping/>
+  </p:clrMapOvr>
+  <p:timing>
+    <p:tnLst>
+      <p:par>
+        <p:cTn id="1" dur="indefinite" restart="never" nodeType="tmRoot"/>
+      </p:par>
+    </p:tnLst>
+  </p:timing>
+</p:sld>
+</file>
+
+<file path=ppt/slides/slide9.xml><?xml version="1.0" encoding="utf-8"?>
+<p:sld xmlns:a="http://schemas.openxmlformats.org/drawingml/2006/main" xmlns:r="http://schemas.openxmlformats.org/officeDocument/2006/relationships" xmlns:p="http://schemas.openxmlformats.org/presentationml/2006/main">
+  <p:cSld>
+    <p:spTree>
+      <p:nvGrpSpPr>
+        <p:cNvPr id="1" name=""/>
+        <p:cNvGrpSpPr/>
+        <p:nvPr/>
+      </p:nvGrpSpPr>
+      <p:grpSpPr>
+        <a:xfrm>
+          <a:off x="0" y="0"/>
+          <a:ext cx="0" cy="0"/>
+          <a:chOff x="0" y="0"/>
+          <a:chExt cx="0" cy="0"/>
+        </a:xfrm>
+      </p:grpSpPr>
+      <p:sp>
+        <p:nvSpPr>
+          <p:cNvPr id="2" name="Título 1"/>
+          <p:cNvSpPr>
+            <a:spLocks noGrp="1"/>
+          </p:cNvSpPr>
+          <p:nvPr>
+            <p:ph type="title"/>
+          </p:nvPr>
+        </p:nvSpPr>
+        <p:spPr/>
+        <p:txBody>
+          <a:bodyPr/>
+          <a:lstStyle/>
+          <a:p>
+            <a:endParaRPr lang="es-CO"/>
+          </a:p>
+        </p:txBody>
+      </p:sp>
+      <p:pic>
+        <p:nvPicPr>
+          <p:cNvPr id="4" name="Marcador de contenido 3" descr="MINGW64:/e/dev/platzi/proyecto1"/>
+          <p:cNvPicPr>
+            <a:picLocks noGrp="1" noChangeAspect="1"/>
+          </p:cNvPicPr>
+          <p:nvPr>
+            <p:ph idx="1"/>
+          </p:nvPr>
+        </p:nvPicPr>
+        <p:blipFill>
+          <a:blip r:embed="rId2">
+            <a:extLst>
+              <a:ext uri="{28A0092B-C50C-407E-A947-70E740481C1C}">
+                <a14:useLocalDpi xmlns:a14="http://schemas.microsoft.com/office/drawing/2010/main" val="0"/>
+              </a:ext>
+            </a:extLst>
+          </a:blip>
+          <a:stretch>
+            <a:fillRect/>
+          </a:stretch>
+        </p:blipFill>
+        <p:spPr>
+          <a:xfrm>
+            <a:off x="-1" y="0"/>
+            <a:ext cx="5637913" cy="6858000"/>
+          </a:xfrm>
+        </p:spPr>
+      </p:pic>
+      <p:pic>
+        <p:nvPicPr>
+          <p:cNvPr id="5" name="Imagen 4" descr="MINGW64:/e/dev/platzi/proyecto1"/>
+          <p:cNvPicPr>
+            <a:picLocks noChangeAspect="1"/>
+          </p:cNvPicPr>
+          <p:nvPr/>
+        </p:nvPicPr>
+        <p:blipFill>
+          <a:blip r:embed="rId3">
+            <a:extLst>
+              <a:ext uri="{28A0092B-C50C-407E-A947-70E740481C1C}">
+                <a14:useLocalDpi xmlns:a14="http://schemas.microsoft.com/office/drawing/2010/main" val="0"/>
+              </a:ext>
+            </a:extLst>
+          </a:blip>
+          <a:stretch>
+            <a:fillRect/>
+          </a:stretch>
+        </p:blipFill>
+        <p:spPr>
+          <a:xfrm>
+            <a:off x="6096000" y="0"/>
+            <a:ext cx="5637914" cy="6858000"/>
+          </a:xfrm>
+          <a:prstGeom prst="rect">
+            <a:avLst/>
+          </a:prstGeom>
+        </p:spPr>
+      </p:pic>
+    </p:spTree>
+    <p:extLst>
+      <p:ext uri="{BB962C8B-B14F-4D97-AF65-F5344CB8AC3E}">
+        <p14:creationId xmlns:p14="http://schemas.microsoft.com/office/powerpoint/2010/main" val="3518279934"/>
       </p:ext>
     </p:extLst>
   </p:cSld>

</xml_diff>